<commit_message>
Site updated: 2023-06-24 22:59:56
</commit_message>
<xml_diff>
--- a/2023/06/24/使用词向量和余弦相似度进行文本查重/新建 Microsoft PowerPoint 演示文稿.pptx
+++ b/2023/06/24/使用词向量和余弦相似度进行文本查重/新建 Microsoft PowerPoint 演示文稿.pptx
@@ -3708,8 +3708,8 @@
         </p:nvSpPr>
         <p:spPr>
           <a:xfrm>
-            <a:off x="3920481" y="234009"/>
-            <a:ext cx="4351037" cy="1862048"/>
+            <a:off x="4139614" y="231109"/>
+            <a:ext cx="3012754" cy="1323439"/>
           </a:xfrm>
           <a:prstGeom prst="rect">
             <a:avLst/>
@@ -3723,7 +3723,7 @@
           <a:lstStyle/>
           <a:p>
             <a:r>
-              <a:rPr lang="en-US" altLang="zh-CN" sz="11500" dirty="0">
+              <a:rPr lang="en-US" altLang="zh-CN" sz="8000" dirty="0">
                 <a:solidFill>
                   <a:schemeClr val="tx1">
                     <a:alpha val="10000"/>
@@ -3733,7 +3733,7 @@
               </a:rPr>
               <a:t>Word</a:t>
             </a:r>
-            <a:endParaRPr lang="zh-CN" altLang="en-US" sz="11500" dirty="0">
+            <a:endParaRPr lang="zh-CN" altLang="en-US" sz="8000" dirty="0">
               <a:solidFill>
                 <a:schemeClr val="tx1">
                   <a:alpha val="10000"/>
@@ -3758,7 +3758,7 @@
         </p:nvSpPr>
         <p:spPr>
           <a:xfrm>
-            <a:off x="3552824" y="1067724"/>
+            <a:off x="3240928" y="768058"/>
             <a:ext cx="4810126" cy="369332"/>
           </a:xfrm>
           <a:prstGeom prst="rect">
@@ -3799,8 +3799,8 @@
         </p:nvGrpSpPr>
         <p:grpSpPr>
           <a:xfrm>
-            <a:off x="4161761" y="2057093"/>
-            <a:ext cx="4193101" cy="2490787"/>
+            <a:off x="4010544" y="1489933"/>
+            <a:ext cx="3264311" cy="1939067"/>
             <a:chOff x="3810946" y="3023647"/>
             <a:chExt cx="3193736" cy="1897144"/>
           </a:xfrm>
@@ -4523,8 +4523,8 @@
         </p:nvSpPr>
         <p:spPr>
           <a:xfrm>
-            <a:off x="3493293" y="4668082"/>
-            <a:ext cx="5241132" cy="1569660"/>
+            <a:off x="3676766" y="3506280"/>
+            <a:ext cx="3931866" cy="1323439"/>
           </a:xfrm>
           <a:prstGeom prst="rect">
             <a:avLst/>
@@ -4538,7 +4538,7 @@
           <a:lstStyle/>
           <a:p>
             <a:r>
-              <a:rPr lang="en-US" altLang="zh-CN" sz="9600" dirty="0">
+              <a:rPr lang="en-US" altLang="zh-CN" sz="8000" dirty="0">
                 <a:solidFill>
                   <a:schemeClr val="tx1">
                     <a:alpha val="10000"/>
@@ -4548,7 +4548,7 @@
               </a:rPr>
               <a:t>Vector</a:t>
             </a:r>
-            <a:endParaRPr lang="zh-CN" altLang="en-US" sz="9600" dirty="0">
+            <a:endParaRPr lang="zh-CN" altLang="en-US" sz="8000" dirty="0">
               <a:solidFill>
                 <a:schemeClr val="tx1">
                   <a:alpha val="10000"/>
@@ -4573,7 +4573,7 @@
         </p:nvSpPr>
         <p:spPr>
           <a:xfrm>
-            <a:off x="3493292" y="5334490"/>
+            <a:off x="3265361" y="4041867"/>
             <a:ext cx="5205413" cy="369332"/>
           </a:xfrm>
           <a:prstGeom prst="rect">
@@ -4613,8 +4613,8 @@
         </p:nvSpPr>
         <p:spPr>
           <a:xfrm>
-            <a:off x="4681065" y="1154178"/>
-            <a:ext cx="2553643" cy="4508927"/>
+            <a:off x="4816929" y="998066"/>
+            <a:ext cx="1651542" cy="2646878"/>
           </a:xfrm>
           <a:prstGeom prst="rect">
             <a:avLst/>
@@ -4628,7 +4628,7 @@
           <a:lstStyle/>
           <a:p>
             <a:r>
-              <a:rPr lang="en-US" altLang="zh-CN" sz="28700" dirty="0">
+              <a:rPr lang="en-US" altLang="zh-CN" sz="16600" dirty="0">
                 <a:solidFill>
                   <a:schemeClr val="tx1">
                     <a:alpha val="10000"/>
@@ -4638,7 +4638,7 @@
               </a:rPr>
               <a:t>2</a:t>
             </a:r>
-            <a:endParaRPr lang="zh-CN" altLang="en-US" sz="28700" dirty="0">
+            <a:endParaRPr lang="zh-CN" altLang="en-US" sz="16600" dirty="0">
               <a:solidFill>
                 <a:schemeClr val="tx1">
                   <a:alpha val="10000"/>

</xml_diff>

<commit_message>
Site updated: 2023-06-25 09:48:44
</commit_message>
<xml_diff>
--- a/2023/06/24/使用词向量和余弦相似度进行文本查重/新建 Microsoft PowerPoint 演示文稿.pptx
+++ b/2023/06/24/使用词向量和余弦相似度进行文本查重/新建 Microsoft PowerPoint 演示文稿.pptx
@@ -3708,7 +3708,7 @@
         </p:nvSpPr>
         <p:spPr>
           <a:xfrm>
-            <a:off x="4139614" y="231109"/>
+            <a:off x="4695200" y="1064484"/>
             <a:ext cx="3012754" cy="1323439"/>
           </a:xfrm>
           <a:prstGeom prst="rect">
@@ -3758,7 +3758,7 @@
         </p:nvSpPr>
         <p:spPr>
           <a:xfrm>
-            <a:off x="3240928" y="768058"/>
+            <a:off x="3796514" y="1601433"/>
             <a:ext cx="4810126" cy="369332"/>
           </a:xfrm>
           <a:prstGeom prst="rect">
@@ -3799,7 +3799,7 @@
         </p:nvGrpSpPr>
         <p:grpSpPr>
           <a:xfrm>
-            <a:off x="4010544" y="1489933"/>
+            <a:off x="4566130" y="2323308"/>
             <a:ext cx="3264311" cy="1939067"/>
             <a:chOff x="3810946" y="3023647"/>
             <a:chExt cx="3193736" cy="1897144"/>
@@ -4523,7 +4523,7 @@
         </p:nvSpPr>
         <p:spPr>
           <a:xfrm>
-            <a:off x="3676766" y="3506280"/>
+            <a:off x="4232352" y="4339655"/>
             <a:ext cx="3931866" cy="1323439"/>
           </a:xfrm>
           <a:prstGeom prst="rect">
@@ -4573,7 +4573,7 @@
         </p:nvSpPr>
         <p:spPr>
           <a:xfrm>
-            <a:off x="3265361" y="4041867"/>
+            <a:off x="3820947" y="4875242"/>
             <a:ext cx="5205413" cy="369332"/>
           </a:xfrm>
           <a:prstGeom prst="rect">
@@ -4613,7 +4613,7 @@
         </p:nvSpPr>
         <p:spPr>
           <a:xfrm>
-            <a:off x="4816929" y="998066"/>
+            <a:off x="5372515" y="1831441"/>
             <a:ext cx="1651542" cy="2646878"/>
           </a:xfrm>
           <a:prstGeom prst="rect">

</xml_diff>